<commit_message>
se sube material variado
</commit_message>
<xml_diff>
--- a/Clases/10_array_de_bits/array de bits.pptx
+++ b/Clases/10_array_de_bits/array de bits.pptx
@@ -320,7 +320,7 @@
               <a:pPr>
                 <a:defRPr/>
               </a:pPr>
-              <a:t>06/10/2019</a:t>
+              <a:t>21/01/2022</a:t>
             </a:fld>
             <a:endParaRPr lang="es-ES" altLang="es-ES"/>
           </a:p>
@@ -572,7 +572,7 @@
               <a:pPr>
                 <a:defRPr/>
               </a:pPr>
-              <a:t>‹#›</a:t>
+              <a:t>‹Nº›</a:t>
             </a:fld>
             <a:endParaRPr lang="es-ES" altLang="es-ES"/>
           </a:p>
@@ -706,6 +706,96 @@
 </p:notesMaster>
 </file>
 
+<file path=ppt/notesSlides/notesSlide1.xml><?xml version="1.0" encoding="utf-8"?>
+<p:notes xmlns:a="http://schemas.openxmlformats.org/drawingml/2006/main" xmlns:r="http://schemas.openxmlformats.org/officeDocument/2006/relationships" xmlns:p="http://schemas.openxmlformats.org/presentationml/2006/main">
+  <p:cSld>
+    <p:spTree>
+      <p:nvGrpSpPr>
+        <p:cNvPr id="1" name=""/>
+        <p:cNvGrpSpPr/>
+        <p:nvPr/>
+      </p:nvGrpSpPr>
+      <p:grpSpPr>
+        <a:xfrm>
+          <a:off x="0" y="0"/>
+          <a:ext cx="0" cy="0"/>
+          <a:chOff x="0" y="0"/>
+          <a:chExt cx="0" cy="0"/>
+        </a:xfrm>
+      </p:grpSpPr>
+      <p:sp>
+        <p:nvSpPr>
+          <p:cNvPr id="2" name="Marcador de imagen de diapositiva 1"/>
+          <p:cNvSpPr>
+            <a:spLocks noGrp="1" noRot="1" noChangeAspect="1"/>
+          </p:cNvSpPr>
+          <p:nvPr>
+            <p:ph type="sldImg"/>
+          </p:nvPr>
+        </p:nvSpPr>
+        <p:spPr/>
+      </p:sp>
+      <p:sp>
+        <p:nvSpPr>
+          <p:cNvPr id="3" name="Marcador de notas 2"/>
+          <p:cNvSpPr>
+            <a:spLocks noGrp="1"/>
+          </p:cNvSpPr>
+          <p:nvPr>
+            <p:ph type="body" idx="1"/>
+          </p:nvPr>
+        </p:nvSpPr>
+        <p:spPr/>
+        <p:txBody>
+          <a:bodyPr/>
+          <a:lstStyle/>
+          <a:p>
+            <a:endParaRPr lang="es-AR" dirty="0"/>
+          </a:p>
+        </p:txBody>
+      </p:sp>
+      <p:sp>
+        <p:nvSpPr>
+          <p:cNvPr id="4" name="Marcador de número de diapositiva 3"/>
+          <p:cNvSpPr>
+            <a:spLocks noGrp="1"/>
+          </p:cNvSpPr>
+          <p:nvPr>
+            <p:ph type="sldNum" sz="quarter" idx="5"/>
+          </p:nvPr>
+        </p:nvSpPr>
+        <p:spPr/>
+        <p:txBody>
+          <a:bodyPr/>
+          <a:lstStyle/>
+          <a:p>
+            <a:pPr>
+              <a:defRPr/>
+            </a:pPr>
+            <a:fld id="{237C07B3-3B54-4CD4-9612-2D4A4EC12D3A}" type="slidenum">
+              <a:rPr lang="es-ES" altLang="es-ES" smtClean="0"/>
+              <a:pPr>
+                <a:defRPr/>
+              </a:pPr>
+              <a:t>24</a:t>
+            </a:fld>
+            <a:endParaRPr lang="es-ES" altLang="es-ES"/>
+          </a:p>
+        </p:txBody>
+      </p:sp>
+    </p:spTree>
+    <p:extLst>
+      <p:ext uri="{BB962C8B-B14F-4D97-AF65-F5344CB8AC3E}">
+        <p14:creationId xmlns:p14="http://schemas.microsoft.com/office/powerpoint/2010/main" val="1597365845"/>
+      </p:ext>
+    </p:extLst>
+  </p:cSld>
+  <p:clrMapOvr>
+    <a:masterClrMapping/>
+  </p:clrMapOvr>
+</p:notes>
+</file>
+
 <file path=ppt/slideLayouts/slideLayout1.xml><?xml version="1.0" encoding="utf-8"?>
 <p:sldLayout xmlns:a="http://schemas.openxmlformats.org/drawingml/2006/main" xmlns:r="http://schemas.openxmlformats.org/officeDocument/2006/relationships" xmlns:p="http://schemas.openxmlformats.org/presentationml/2006/main" type="title" preserve="1">
   <p:cSld name="Title Slide">
@@ -972,7 +1062,7 @@
               <a:pPr>
                 <a:defRPr/>
               </a:pPr>
-              <a:t>‹#›</a:t>
+              <a:t>‹Nº›</a:t>
             </a:fld>
             <a:endParaRPr lang="es-ES" altLang="en-US"/>
           </a:p>
@@ -1286,7 +1376,7 @@
               <a:pPr>
                 <a:defRPr/>
               </a:pPr>
-              <a:t>‹#›</a:t>
+              <a:t>‹Nº›</a:t>
             </a:fld>
             <a:endParaRPr lang="es-ES" altLang="en-US"/>
           </a:p>
@@ -1518,7 +1608,7 @@
               <a:pPr>
                 <a:defRPr/>
               </a:pPr>
-              <a:t>‹#›</a:t>
+              <a:t>‹Nº›</a:t>
             </a:fld>
             <a:endParaRPr lang="es-ES" altLang="en-US"/>
           </a:p>
@@ -1949,7 +2039,7 @@
               <a:pPr>
                 <a:defRPr/>
               </a:pPr>
-              <a:t>‹#›</a:t>
+              <a:t>‹Nº›</a:t>
             </a:fld>
             <a:endParaRPr lang="es-ES" altLang="en-US"/>
           </a:p>
@@ -2234,7 +2324,7 @@
               <a:pPr>
                 <a:defRPr/>
               </a:pPr>
-              <a:t>‹#›</a:t>
+              <a:t>‹Nº›</a:t>
             </a:fld>
             <a:endParaRPr lang="es-ES" altLang="en-US"/>
           </a:p>
@@ -2907,7 +2997,7 @@
               <a:pPr>
                 <a:defRPr/>
               </a:pPr>
-              <a:t>‹#›</a:t>
+              <a:t>‹Nº›</a:t>
             </a:fld>
             <a:endParaRPr lang="es-ES" altLang="en-US"/>
           </a:p>
@@ -3820,7 +3910,7 @@
               <a:pPr>
                 <a:defRPr/>
               </a:pPr>
-              <a:t>‹#›</a:t>
+              <a:t>‹Nº›</a:t>
             </a:fld>
             <a:endParaRPr lang="es-ES" altLang="en-US"/>
           </a:p>
@@ -4028,7 +4118,7 @@
               <a:pPr>
                 <a:defRPr/>
               </a:pPr>
-              <a:t>‹#›</a:t>
+              <a:t>‹Nº›</a:t>
             </a:fld>
             <a:endParaRPr lang="es-ES" altLang="en-US"/>
           </a:p>
@@ -4246,7 +4336,7 @@
               <a:pPr>
                 <a:defRPr/>
               </a:pPr>
-              <a:t>‹#›</a:t>
+              <a:t>‹Nº›</a:t>
             </a:fld>
             <a:endParaRPr lang="es-ES" altLang="en-US"/>
           </a:p>
@@ -4518,7 +4608,7 @@
               <a:pPr>
                 <a:defRPr/>
               </a:pPr>
-              <a:t>‹#›</a:t>
+              <a:t>‹Nº›</a:t>
             </a:fld>
             <a:endParaRPr lang="es-ES" altLang="en-US"/>
           </a:p>
@@ -4726,7 +4816,7 @@
               <a:pPr>
                 <a:defRPr/>
               </a:pPr>
-              <a:t>‹#›</a:t>
+              <a:t>‹Nº›</a:t>
             </a:fld>
             <a:endParaRPr lang="es-ES" altLang="en-US"/>
           </a:p>
@@ -5011,7 +5101,7 @@
               <a:pPr>
                 <a:defRPr/>
               </a:pPr>
-              <a:t>‹#›</a:t>
+              <a:t>‹Nº›</a:t>
             </a:fld>
             <a:endParaRPr lang="es-ES" altLang="en-US"/>
           </a:p>
@@ -5341,7 +5431,7 @@
               <a:pPr>
                 <a:defRPr/>
               </a:pPr>
-              <a:t>‹#›</a:t>
+              <a:t>‹Nº›</a:t>
             </a:fld>
             <a:endParaRPr lang="es-ES" altLang="en-US"/>
           </a:p>
@@ -5823,7 +5913,7 @@
               <a:pPr>
                 <a:defRPr/>
               </a:pPr>
-              <a:t>‹#›</a:t>
+              <a:t>‹Nº›</a:t>
             </a:fld>
             <a:endParaRPr lang="es-ES" altLang="en-US"/>
           </a:p>
@@ -5979,7 +6069,7 @@
               <a:pPr>
                 <a:defRPr/>
               </a:pPr>
-              <a:t>‹#›</a:t>
+              <a:t>‹Nº›</a:t>
             </a:fld>
             <a:endParaRPr lang="es-ES" altLang="en-US"/>
           </a:p>
@@ -6112,7 +6202,7 @@
               <a:pPr>
                 <a:defRPr/>
               </a:pPr>
-              <a:t>‹#›</a:t>
+              <a:t>‹Nº›</a:t>
             </a:fld>
             <a:endParaRPr lang="es-ES" altLang="en-US"/>
           </a:p>
@@ -6429,7 +6519,7 @@
               <a:pPr>
                 <a:defRPr/>
               </a:pPr>
-              <a:t>‹#›</a:t>
+              <a:t>‹Nº›</a:t>
             </a:fld>
             <a:endParaRPr lang="es-ES" altLang="en-US"/>
           </a:p>
@@ -6743,7 +6833,7 @@
               <a:pPr>
                 <a:defRPr/>
               </a:pPr>
-              <a:t>‹#›</a:t>
+              <a:t>‹Nº›</a:t>
             </a:fld>
             <a:endParaRPr lang="es-ES" altLang="en-US"/>
           </a:p>
@@ -7147,7 +7237,7 @@
               <a:pPr>
                 <a:defRPr/>
               </a:pPr>
-              <a:t>‹#›</a:t>
+              <a:t>‹Nº›</a:t>
             </a:fld>
             <a:endParaRPr lang="es-ES" altLang="en-US"/>
           </a:p>
@@ -8909,7 +8999,7 @@
         </p:nvSpPr>
         <p:spPr>
           <a:xfrm>
-            <a:off x="803189" y="1600201"/>
+            <a:off x="803189" y="1625025"/>
             <a:ext cx="4191000" cy="584775"/>
           </a:xfrm>
           <a:prstGeom prst="rect">
@@ -23313,7 +23403,7 @@
         </p:nvSpPr>
         <p:spPr>
           <a:xfrm>
-            <a:off x="1600200" y="1981200"/>
+            <a:off x="1524000" y="1981200"/>
             <a:ext cx="6096000" cy="4401205"/>
           </a:xfrm>
           <a:prstGeom prst="rect">

</xml_diff>